<commit_message>
Conclusion of the Presentation
</commit_message>
<xml_diff>
--- a/Editables/Fase 3 - Construção.pptx
+++ b/Editables/Fase 3 - Construção.pptx
@@ -5,10 +5,10 @@
     <p:sldMasterId id="2147483708" r:id="rId4"/>
   </p:sldMasterIdLst>
   <p:notesMasterIdLst>
-    <p:notesMasterId r:id="rId16"/>
+    <p:notesMasterId r:id="rId17"/>
   </p:notesMasterIdLst>
   <p:handoutMasterIdLst>
-    <p:handoutMasterId r:id="rId17"/>
+    <p:handoutMasterId r:id="rId18"/>
   </p:handoutMasterIdLst>
   <p:sldIdLst>
     <p:sldId id="256" r:id="rId5"/>
@@ -21,7 +21,8 @@
     <p:sldId id="277" r:id="rId12"/>
     <p:sldId id="284" r:id="rId13"/>
     <p:sldId id="286" r:id="rId14"/>
-    <p:sldId id="267" r:id="rId15"/>
+    <p:sldId id="288" r:id="rId15"/>
+    <p:sldId id="267" r:id="rId16"/>
   </p:sldIdLst>
   <p:sldSz cx="12192000" cy="6858000"/>
   <p:notesSz cx="6858000" cy="9144000"/>
@@ -145,7 +146,7 @@
 <file path=ppt/revisionInfo.xml><?xml version="1.0" encoding="utf-8"?>
 <p1510:revInfo xmlns:a="http://schemas.openxmlformats.org/drawingml/2006/main" xmlns:r="http://schemas.openxmlformats.org/officeDocument/2006/relationships" xmlns:p1510="http://schemas.microsoft.com/office/powerpoint/2015/10/main">
   <p1510:revLst>
-    <p1510:client id="{E6087568-9E66-4C67-8420-88369500C5DA}" v="304" dt="2023-05-17T15:54:57.082"/>
+    <p1510:client id="{E6087568-9E66-4C67-8420-88369500C5DA}" v="306" dt="2023-05-17T18:33:46.986"/>
   </p1510:revLst>
 </p1510:revInfo>
 </file>
@@ -580,7 +581,7 @@
   <pc:docChgLst>
     <pc:chgData name="Tiago Fonseca" userId="0bf00240-3020-4d01-a24b-06825a2f49d7" providerId="ADAL" clId="{E6087568-9E66-4C67-8420-88369500C5DA}"/>
     <pc:docChg chg="undo custSel addSld delSld modSld">
-      <pc:chgData name="Tiago Fonseca" userId="0bf00240-3020-4d01-a24b-06825a2f49d7" providerId="ADAL" clId="{E6087568-9E66-4C67-8420-88369500C5DA}" dt="2023-05-17T16:12:31.678" v="2136" actId="20577"/>
+      <pc:chgData name="Tiago Fonseca" userId="0bf00240-3020-4d01-a24b-06825a2f49d7" providerId="ADAL" clId="{E6087568-9E66-4C67-8420-88369500C5DA}" dt="2023-05-17T18:35:20.516" v="4240" actId="20577"/>
       <pc:docMkLst>
         <pc:docMk/>
       </pc:docMkLst>
@@ -599,18 +600,50 @@
           </ac:spMkLst>
         </pc:spChg>
       </pc:sldChg>
-      <pc:sldChg chg="modSp mod">
-        <pc:chgData name="Tiago Fonseca" userId="0bf00240-3020-4d01-a24b-06825a2f49d7" providerId="ADAL" clId="{E6087568-9E66-4C67-8420-88369500C5DA}" dt="2023-05-17T15:23:21.451" v="78" actId="20577"/>
+      <pc:sldChg chg="addSp delSp modSp mod">
+        <pc:chgData name="Tiago Fonseca" userId="0bf00240-3020-4d01-a24b-06825a2f49d7" providerId="ADAL" clId="{E6087568-9E66-4C67-8420-88369500C5DA}" dt="2023-05-17T18:25:10.446" v="3051" actId="20577"/>
         <pc:sldMkLst>
           <pc:docMk/>
           <pc:sldMk cId="3065993080" sldId="272"/>
         </pc:sldMkLst>
         <pc:spChg chg="mod">
-          <ac:chgData name="Tiago Fonseca" userId="0bf00240-3020-4d01-a24b-06825a2f49d7" providerId="ADAL" clId="{E6087568-9E66-4C67-8420-88369500C5DA}" dt="2023-05-17T15:23:21.451" v="78" actId="20577"/>
+          <ac:chgData name="Tiago Fonseca" userId="0bf00240-3020-4d01-a24b-06825a2f49d7" providerId="ADAL" clId="{E6087568-9E66-4C67-8420-88369500C5DA}" dt="2023-05-17T18:24:47.576" v="3035" actId="20577"/>
           <ac:spMkLst>
             <pc:docMk/>
             <pc:sldMk cId="3065993080" sldId="272"/>
             <ac:spMk id="2" creationId="{98A32DE6-6B29-7489-635B-950DAAB3B577}"/>
+          </ac:spMkLst>
+        </pc:spChg>
+        <pc:spChg chg="del">
+          <ac:chgData name="Tiago Fonseca" userId="0bf00240-3020-4d01-a24b-06825a2f49d7" providerId="ADAL" clId="{E6087568-9E66-4C67-8420-88369500C5DA}" dt="2023-05-17T18:16:08.462" v="2142" actId="478"/>
+          <ac:spMkLst>
+            <pc:docMk/>
+            <pc:sldMk cId="3065993080" sldId="272"/>
+            <ac:spMk id="3" creationId="{E82AFDAC-88B1-3AB9-A268-4DF9CBD41DFE}"/>
+          </ac:spMkLst>
+        </pc:spChg>
+        <pc:spChg chg="del">
+          <ac:chgData name="Tiago Fonseca" userId="0bf00240-3020-4d01-a24b-06825a2f49d7" providerId="ADAL" clId="{E6087568-9E66-4C67-8420-88369500C5DA}" dt="2023-05-17T18:16:14.752" v="2144" actId="478"/>
+          <ac:spMkLst>
+            <pc:docMk/>
+            <pc:sldMk cId="3065993080" sldId="272"/>
+            <ac:spMk id="4" creationId="{92CFAAB8-82E9-6F73-6CC3-681D1C6495C1}"/>
+          </ac:spMkLst>
+        </pc:spChg>
+        <pc:spChg chg="del">
+          <ac:chgData name="Tiago Fonseca" userId="0bf00240-3020-4d01-a24b-06825a2f49d7" providerId="ADAL" clId="{E6087568-9E66-4C67-8420-88369500C5DA}" dt="2023-05-17T18:16:15.819" v="2145" actId="478"/>
+          <ac:spMkLst>
+            <pc:docMk/>
+            <pc:sldMk cId="3065993080" sldId="272"/>
+            <ac:spMk id="5" creationId="{523D7428-4450-98A4-7C9A-A059F73C4BBB}"/>
+          </ac:spMkLst>
+        </pc:spChg>
+        <pc:spChg chg="add mod">
+          <ac:chgData name="Tiago Fonseca" userId="0bf00240-3020-4d01-a24b-06825a2f49d7" providerId="ADAL" clId="{E6087568-9E66-4C67-8420-88369500C5DA}" dt="2023-05-17T18:25:10.446" v="3051" actId="20577"/>
+          <ac:spMkLst>
+            <pc:docMk/>
+            <pc:sldMk cId="3065993080" sldId="272"/>
+            <ac:spMk id="7" creationId="{4CDF2A1F-BDE4-7ECC-7CEB-42822AAE7A2D}"/>
           </ac:spMkLst>
         </pc:spChg>
       </pc:sldChg>
@@ -678,19 +711,27 @@
         </pc:picChg>
       </pc:sldChg>
       <pc:sldChg chg="modSp mod">
-        <pc:chgData name="Tiago Fonseca" userId="0bf00240-3020-4d01-a24b-06825a2f49d7" providerId="ADAL" clId="{E6087568-9E66-4C67-8420-88369500C5DA}" dt="2023-05-17T15:23:04.069" v="36" actId="20577"/>
+        <pc:chgData name="Tiago Fonseca" userId="0bf00240-3020-4d01-a24b-06825a2f49d7" providerId="ADAL" clId="{E6087568-9E66-4C67-8420-88369500C5DA}" dt="2023-05-17T18:15:18.861" v="2141" actId="20577"/>
         <pc:sldMkLst>
           <pc:docMk/>
           <pc:sldMk cId="996926825" sldId="279"/>
         </pc:sldMkLst>
         <pc:spChg chg="mod">
-          <ac:chgData name="Tiago Fonseca" userId="0bf00240-3020-4d01-a24b-06825a2f49d7" providerId="ADAL" clId="{E6087568-9E66-4C67-8420-88369500C5DA}" dt="2023-05-17T15:23:04.069" v="36" actId="20577"/>
+          <ac:chgData name="Tiago Fonseca" userId="0bf00240-3020-4d01-a24b-06825a2f49d7" providerId="ADAL" clId="{E6087568-9E66-4C67-8420-88369500C5DA}" dt="2023-05-17T18:15:18.861" v="2141" actId="20577"/>
           <ac:spMkLst>
             <pc:docMk/>
             <pc:sldMk cId="996926825" sldId="279"/>
             <ac:spMk id="2" creationId="{E734342C-2173-4B23-9C3C-2950C6A3983D}"/>
           </ac:spMkLst>
         </pc:spChg>
+        <pc:picChg chg="mod">
+          <ac:chgData name="Tiago Fonseca" userId="0bf00240-3020-4d01-a24b-06825a2f49d7" providerId="ADAL" clId="{E6087568-9E66-4C67-8420-88369500C5DA}" dt="2023-05-17T18:15:15.333" v="2138" actId="1076"/>
+          <ac:picMkLst>
+            <pc:docMk/>
+            <pc:sldMk cId="996926825" sldId="279"/>
+            <ac:picMk id="5" creationId="{BDEE4019-56F2-459C-B15D-76C0CDC216FA}"/>
+          </ac:picMkLst>
+        </pc:picChg>
       </pc:sldChg>
       <pc:sldChg chg="modSp mod">
         <pc:chgData name="Tiago Fonseca" userId="0bf00240-3020-4d01-a24b-06825a2f49d7" providerId="ADAL" clId="{E6087568-9E66-4C67-8420-88369500C5DA}" dt="2023-05-17T15:23:47.034" v="109" actId="20577"/>
@@ -872,7 +913,7 @@
         </pc:spChg>
       </pc:sldChg>
       <pc:sldChg chg="addSp delSp modSp mod">
-        <pc:chgData name="Tiago Fonseca" userId="0bf00240-3020-4d01-a24b-06825a2f49d7" providerId="ADAL" clId="{E6087568-9E66-4C67-8420-88369500C5DA}" dt="2023-05-17T16:10:12.966" v="1879" actId="20577"/>
+        <pc:chgData name="Tiago Fonseca" userId="0bf00240-3020-4d01-a24b-06825a2f49d7" providerId="ADAL" clId="{E6087568-9E66-4C67-8420-88369500C5DA}" dt="2023-05-17T18:32:26.070" v="3986" actId="27636"/>
         <pc:sldMkLst>
           <pc:docMk/>
           <pc:sldMk cId="4239780882" sldId="286"/>
@@ -910,7 +951,7 @@
           </ac:spMkLst>
         </pc:spChg>
         <pc:spChg chg="add mod">
-          <ac:chgData name="Tiago Fonseca" userId="0bf00240-3020-4d01-a24b-06825a2f49d7" providerId="ADAL" clId="{E6087568-9E66-4C67-8420-88369500C5DA}" dt="2023-05-17T16:10:12.966" v="1879" actId="20577"/>
+          <ac:chgData name="Tiago Fonseca" userId="0bf00240-3020-4d01-a24b-06825a2f49d7" providerId="ADAL" clId="{E6087568-9E66-4C67-8420-88369500C5DA}" dt="2023-05-17T18:32:26.070" v="3986" actId="27636"/>
           <ac:spMkLst>
             <pc:docMk/>
             <pc:sldMk cId="4239780882" sldId="286"/>
@@ -935,7 +976,30 @@
         </pc:spChg>
       </pc:sldChg>
       <pc:sldChg chg="modSp add mod">
-        <pc:chgData name="Tiago Fonseca" userId="0bf00240-3020-4d01-a24b-06825a2f49d7" providerId="ADAL" clId="{E6087568-9E66-4C67-8420-88369500C5DA}" dt="2023-05-17T15:23:35.578" v="91" actId="20577"/>
+        <pc:chgData name="Tiago Fonseca" userId="0bf00240-3020-4d01-a24b-06825a2f49d7" providerId="ADAL" clId="{E6087568-9E66-4C67-8420-88369500C5DA}" dt="2023-05-17T18:29:20.975" v="3911" actId="20577"/>
+        <pc:sldMkLst>
+          <pc:docMk/>
+          <pc:sldMk cId="831434331" sldId="287"/>
+        </pc:sldMkLst>
+        <pc:spChg chg="mod">
+          <ac:chgData name="Tiago Fonseca" userId="0bf00240-3020-4d01-a24b-06825a2f49d7" providerId="ADAL" clId="{E6087568-9E66-4C67-8420-88369500C5DA}" dt="2023-05-17T18:25:34.112" v="3069" actId="20577"/>
+          <ac:spMkLst>
+            <pc:docMk/>
+            <pc:sldMk cId="831434331" sldId="287"/>
+            <ac:spMk id="2" creationId="{98A32DE6-6B29-7489-635B-950DAAB3B577}"/>
+          </ac:spMkLst>
+        </pc:spChg>
+        <pc:spChg chg="mod">
+          <ac:chgData name="Tiago Fonseca" userId="0bf00240-3020-4d01-a24b-06825a2f49d7" providerId="ADAL" clId="{E6087568-9E66-4C67-8420-88369500C5DA}" dt="2023-05-17T18:29:20.975" v="3911" actId="20577"/>
+          <ac:spMkLst>
+            <pc:docMk/>
+            <pc:sldMk cId="831434331" sldId="287"/>
+            <ac:spMk id="7" creationId="{4CDF2A1F-BDE4-7ECC-7CEB-42822AAE7A2D}"/>
+          </ac:spMkLst>
+        </pc:spChg>
+      </pc:sldChg>
+      <pc:sldChg chg="addSp delSp modSp add del mod">
+        <pc:chgData name="Tiago Fonseca" userId="0bf00240-3020-4d01-a24b-06825a2f49d7" providerId="ADAL" clId="{E6087568-9E66-4C67-8420-88369500C5DA}" dt="2023-05-17T18:18:07.066" v="2306" actId="47"/>
         <pc:sldMkLst>
           <pc:docMk/>
           <pc:sldMk cId="1586823910" sldId="287"/>
@@ -946,6 +1010,53 @@
             <pc:docMk/>
             <pc:sldMk cId="1586823910" sldId="287"/>
             <ac:spMk id="2" creationId="{98A32DE6-6B29-7489-635B-950DAAB3B577}"/>
+          </ac:spMkLst>
+        </pc:spChg>
+        <pc:spChg chg="del">
+          <ac:chgData name="Tiago Fonseca" userId="0bf00240-3020-4d01-a24b-06825a2f49d7" providerId="ADAL" clId="{E6087568-9E66-4C67-8420-88369500C5DA}" dt="2023-05-17T18:17:42.076" v="2301" actId="478"/>
+          <ac:spMkLst>
+            <pc:docMk/>
+            <pc:sldMk cId="1586823910" sldId="287"/>
+            <ac:spMk id="3" creationId="{E82AFDAC-88B1-3AB9-A268-4DF9CBD41DFE}"/>
+          </ac:spMkLst>
+        </pc:spChg>
+        <pc:spChg chg="del">
+          <ac:chgData name="Tiago Fonseca" userId="0bf00240-3020-4d01-a24b-06825a2f49d7" providerId="ADAL" clId="{E6087568-9E66-4C67-8420-88369500C5DA}" dt="2023-05-17T18:17:46.271" v="2303" actId="478"/>
+          <ac:spMkLst>
+            <pc:docMk/>
+            <pc:sldMk cId="1586823910" sldId="287"/>
+            <ac:spMk id="4" creationId="{92CFAAB8-82E9-6F73-6CC3-681D1C6495C1}"/>
+          </ac:spMkLst>
+        </pc:spChg>
+        <pc:spChg chg="del">
+          <ac:chgData name="Tiago Fonseca" userId="0bf00240-3020-4d01-a24b-06825a2f49d7" providerId="ADAL" clId="{E6087568-9E66-4C67-8420-88369500C5DA}" dt="2023-05-17T18:17:48.581" v="2304" actId="478"/>
+          <ac:spMkLst>
+            <pc:docMk/>
+            <pc:sldMk cId="1586823910" sldId="287"/>
+            <ac:spMk id="5" creationId="{523D7428-4450-98A4-7C9A-A059F73C4BBB}"/>
+          </ac:spMkLst>
+        </pc:spChg>
+        <pc:spChg chg="add mod">
+          <ac:chgData name="Tiago Fonseca" userId="0bf00240-3020-4d01-a24b-06825a2f49d7" providerId="ADAL" clId="{E6087568-9E66-4C67-8420-88369500C5DA}" dt="2023-05-17T18:17:51.539" v="2305" actId="14100"/>
+          <ac:spMkLst>
+            <pc:docMk/>
+            <pc:sldMk cId="1586823910" sldId="287"/>
+            <ac:spMk id="7" creationId="{4490ABC2-259B-F787-AAC6-C5FFD2F3BA35}"/>
+          </ac:spMkLst>
+        </pc:spChg>
+      </pc:sldChg>
+      <pc:sldChg chg="modSp add mod">
+        <pc:chgData name="Tiago Fonseca" userId="0bf00240-3020-4d01-a24b-06825a2f49d7" providerId="ADAL" clId="{E6087568-9E66-4C67-8420-88369500C5DA}" dt="2023-05-17T18:35:20.516" v="4240" actId="20577"/>
+        <pc:sldMkLst>
+          <pc:docMk/>
+          <pc:sldMk cId="2100602676" sldId="288"/>
+        </pc:sldMkLst>
+        <pc:spChg chg="mod">
+          <ac:chgData name="Tiago Fonseca" userId="0bf00240-3020-4d01-a24b-06825a2f49d7" providerId="ADAL" clId="{E6087568-9E66-4C67-8420-88369500C5DA}" dt="2023-05-17T18:35:20.516" v="4240" actId="20577"/>
+          <ac:spMkLst>
+            <pc:docMk/>
+            <pc:sldMk cId="2100602676" sldId="288"/>
+            <ac:spMk id="7" creationId="{3781BB72-06CF-6EC3-7E08-64DE68C0CE29}"/>
           </ac:spMkLst>
         </pc:spChg>
       </pc:sldChg>
@@ -2633,7 +2744,7 @@
           <a:p>
             <a:fld id="{44525C07-A26B-43C4-826F-2469C0661D24}" type="slidenum">
               <a:rPr lang="pt-PT" smtClean="0"/>
-              <a:t>11</a:t>
+              <a:t>12</a:t>
             </a:fld>
             <a:endParaRPr lang="pt-PT"/>
           </a:p>
@@ -6586,7 +6697,7 @@
         </p:spPr>
         <p:txBody>
           <a:bodyPr>
-            <a:normAutofit fontScale="85000" lnSpcReduction="20000"/>
+            <a:normAutofit/>
           </a:bodyPr>
           <a:lstStyle/>
           <a:p>
@@ -6653,20 +6764,6 @@
             <a:r>
               <a:rPr lang="pt-PT" dirty="0"/>
               <a:t>”, devido à sua versatilidade e rápida reutilização</a:t>
-            </a:r>
-          </a:p>
-          <a:p>
-            <a:r>
-              <a:rPr lang="pt-PT" dirty="0"/>
-              <a:t>Para a coordenação do desenvolvimento do software, foi utilizado o </a:t>
-            </a:r>
-            <a:r>
-              <a:rPr lang="pt-PT" dirty="0" err="1"/>
-              <a:t>Github</a:t>
-            </a:r>
-            <a:r>
-              <a:rPr lang="pt-PT" dirty="0"/>
-              <a:t>, de forma a manter um alto controlo de versões.</a:t>
             </a:r>
           </a:p>
         </p:txBody>
@@ -6685,6 +6782,173 @@
 </file>
 
 <file path=ppt/slides/slide11.xml><?xml version="1.0" encoding="utf-8"?>
+<p:sld xmlns:a="http://schemas.openxmlformats.org/drawingml/2006/main" xmlns:r="http://schemas.openxmlformats.org/officeDocument/2006/relationships" xmlns:p="http://schemas.openxmlformats.org/presentationml/2006/main">
+  <p:cSld>
+    <p:spTree>
+      <p:nvGrpSpPr>
+        <p:cNvPr id="1" name=""/>
+        <p:cNvGrpSpPr/>
+        <p:nvPr/>
+      </p:nvGrpSpPr>
+      <p:grpSpPr>
+        <a:xfrm>
+          <a:off x="0" y="0"/>
+          <a:ext cx="0" cy="0"/>
+          <a:chOff x="0" y="0"/>
+          <a:chExt cx="0" cy="0"/>
+        </a:xfrm>
+      </p:grpSpPr>
+      <p:sp>
+        <p:nvSpPr>
+          <p:cNvPr id="2" name="Título 1">
+            <a:extLst>
+              <a:ext uri="{FF2B5EF4-FFF2-40B4-BE49-F238E27FC236}">
+                <a16:creationId xmlns:a16="http://schemas.microsoft.com/office/drawing/2014/main" id="{931451AD-4895-B705-D9DD-AE4EECD87102}"/>
+              </a:ext>
+            </a:extLst>
+          </p:cNvPr>
+          <p:cNvSpPr>
+            <a:spLocks noGrp="1"/>
+          </p:cNvSpPr>
+          <p:nvPr>
+            <p:ph type="title"/>
+          </p:nvPr>
+        </p:nvSpPr>
+        <p:spPr/>
+        <p:txBody>
+          <a:bodyPr/>
+          <a:lstStyle/>
+          <a:p>
+            <a:pPr algn="ctr"/>
+            <a:r>
+              <a:rPr lang="pt-PT" dirty="0"/>
+              <a:t>Estratégia </a:t>
+            </a:r>
+            <a:r>
+              <a:rPr lang="pt-PT"/>
+              <a:t>de implementação</a:t>
+            </a:r>
+            <a:endParaRPr lang="pt-PT" dirty="0"/>
+          </a:p>
+        </p:txBody>
+      </p:sp>
+      <p:sp>
+        <p:nvSpPr>
+          <p:cNvPr id="7" name="Marcador de Posição de Conteúdo 6">
+            <a:extLst>
+              <a:ext uri="{FF2B5EF4-FFF2-40B4-BE49-F238E27FC236}">
+                <a16:creationId xmlns:a16="http://schemas.microsoft.com/office/drawing/2014/main" id="{3781BB72-06CF-6EC3-7E08-64DE68C0CE29}"/>
+              </a:ext>
+            </a:extLst>
+          </p:cNvPr>
+          <p:cNvSpPr>
+            <a:spLocks noGrp="1"/>
+          </p:cNvSpPr>
+          <p:nvPr>
+            <p:ph sz="half" idx="2"/>
+          </p:nvPr>
+        </p:nvSpPr>
+        <p:spPr>
+          <a:xfrm>
+            <a:off x="1447191" y="2244606"/>
+            <a:ext cx="9697059" cy="2645802"/>
+          </a:xfrm>
+        </p:spPr>
+        <p:txBody>
+          <a:bodyPr>
+            <a:normAutofit lnSpcReduction="10000"/>
+          </a:bodyPr>
+          <a:lstStyle/>
+          <a:p>
+            <a:r>
+              <a:rPr lang="pt-PT" dirty="0"/>
+              <a:t>Para a coordenação do desenvolvimento do software, foi utilizado o </a:t>
+            </a:r>
+            <a:r>
+              <a:rPr lang="pt-PT" dirty="0" err="1"/>
+              <a:t>Github</a:t>
+            </a:r>
+            <a:r>
+              <a:rPr lang="pt-PT" dirty="0"/>
+              <a:t>, de forma a manter um alto controlo de versões.</a:t>
+            </a:r>
+          </a:p>
+          <a:p>
+            <a:r>
+              <a:rPr lang="pt-PT" dirty="0"/>
+              <a:t>“</a:t>
+            </a:r>
+            <a:r>
+              <a:rPr lang="pt-PT" dirty="0" err="1"/>
+              <a:t>Frontend</a:t>
+            </a:r>
+            <a:r>
+              <a:rPr lang="pt-PT" dirty="0"/>
+              <a:t>” (HTML) : Lucas Matos</a:t>
+            </a:r>
+          </a:p>
+          <a:p>
+            <a:r>
+              <a:rPr lang="pt-PT" dirty="0"/>
+              <a:t>“</a:t>
+            </a:r>
+            <a:r>
+              <a:rPr lang="pt-PT" dirty="0" err="1"/>
+              <a:t>Frontend</a:t>
+            </a:r>
+            <a:r>
+              <a:rPr lang="pt-PT" dirty="0"/>
+              <a:t>” (JS e CSS) : Hugo Xavier</a:t>
+            </a:r>
+          </a:p>
+          <a:p>
+            <a:r>
+              <a:rPr lang="pt-PT" dirty="0"/>
+              <a:t>“</a:t>
+            </a:r>
+            <a:r>
+              <a:rPr lang="pt-PT" dirty="0" err="1"/>
+              <a:t>Backend</a:t>
+            </a:r>
+            <a:r>
+              <a:rPr lang="pt-PT" dirty="0"/>
+              <a:t>” (Autenticações) : Filipe Sousa</a:t>
+            </a:r>
+          </a:p>
+          <a:p>
+            <a:r>
+              <a:rPr lang="pt-PT" dirty="0"/>
+              <a:t>“</a:t>
+            </a:r>
+            <a:r>
+              <a:rPr lang="pt-PT" dirty="0" err="1"/>
+              <a:t>Backend</a:t>
+            </a:r>
+            <a:r>
+              <a:rPr lang="pt-PT" dirty="0"/>
+              <a:t>” (Base de Dados) : </a:t>
+            </a:r>
+            <a:r>
+              <a:rPr lang="pt-PT"/>
+              <a:t>Tiago Fonseca</a:t>
+            </a:r>
+          </a:p>
+        </p:txBody>
+      </p:sp>
+    </p:spTree>
+    <p:extLst>
+      <p:ext uri="{BB962C8B-B14F-4D97-AF65-F5344CB8AC3E}">
+        <p14:creationId xmlns:p14="http://schemas.microsoft.com/office/powerpoint/2010/main" val="2100602676"/>
+      </p:ext>
+    </p:extLst>
+  </p:cSld>
+  <p:clrMapOvr>
+    <a:masterClrMapping/>
+  </p:clrMapOvr>
+</p:sld>
+</file>
+
+<file path=ppt/slides/slide12.xml><?xml version="1.0" encoding="utf-8"?>
 <p:sld xmlns:a="http://schemas.openxmlformats.org/drawingml/2006/main" xmlns:r="http://schemas.openxmlformats.org/officeDocument/2006/relationships" xmlns:p="http://schemas.openxmlformats.org/presentationml/2006/main">
   <p:cSld>
     <p:bg>
@@ -7643,7 +7907,7 @@
                   <a:srgbClr val="FFFFFE"/>
                 </a:solidFill>
               </a:rPr>
-              <a:t>Objetivos pretendidos</a:t>
+              <a:t>Objetivos</a:t>
             </a:r>
           </a:p>
         </p:txBody>
@@ -7749,18 +8013,19 @@
           <a:p>
             <a:pPr algn="ctr"/>
             <a:r>
-              <a:rPr lang="pt-PT" dirty="0"/>
-              <a:t>qualidades</a:t>
-            </a:r>
+              <a:rPr lang="pt-PT" dirty="0" err="1"/>
+              <a:t>qUalidades</a:t>
+            </a:r>
+            <a:endParaRPr lang="pt-PT" dirty="0"/>
           </a:p>
         </p:txBody>
       </p:sp>
       <p:sp>
         <p:nvSpPr>
-          <p:cNvPr id="3" name="Marcador de Posição de Conteúdo 2">
+          <p:cNvPr id="7" name="Marcador de Posição de Conteúdo 6">
             <a:extLst>
               <a:ext uri="{FF2B5EF4-FFF2-40B4-BE49-F238E27FC236}">
-                <a16:creationId xmlns:a16="http://schemas.microsoft.com/office/drawing/2014/main" id="{E82AFDAC-88B1-3AB9-A268-4DF9CBD41DFE}"/>
+                <a16:creationId xmlns:a16="http://schemas.microsoft.com/office/drawing/2014/main" id="{4CDF2A1F-BDE4-7ECC-7CEB-42822AAE7A2D}"/>
               </a:ext>
             </a:extLst>
           </p:cNvPr>
@@ -7773,570 +8038,29 @@
         </p:nvSpPr>
         <p:spPr>
           <a:xfrm>
-            <a:off x="1451579" y="2015732"/>
-            <a:ext cx="3425221" cy="3450613"/>
+            <a:off x="1451579" y="2106386"/>
+            <a:ext cx="9603275" cy="3359959"/>
           </a:xfrm>
         </p:spPr>
         <p:txBody>
           <a:bodyPr/>
           <a:lstStyle/>
           <a:p>
-            <a:pPr marL="0" indent="0">
-              <a:buNone/>
-            </a:pPr>
             <a:r>
               <a:rPr lang="pt-PT" dirty="0"/>
-              <a:t>Interface e Usabilidade:</a:t>
+              <a:t>Facilidade de acesso em todo o lado e a qualquer momento, sem necessidade de instalação de qualquer tipo de “software”</a:t>
             </a:r>
           </a:p>
           <a:p>
             <a:r>
               <a:rPr lang="pt-PT" dirty="0"/>
-              <a:t>Navegabilidade Livre</a:t>
+              <a:t>Toda a informação e dados dos utilizadores são mantidos internamente, garantindo assim um nível de segurança elevado</a:t>
             </a:r>
           </a:p>
           <a:p>
             <a:r>
               <a:rPr lang="pt-PT" dirty="0"/>
-              <a:t>Facilidade de Uso</a:t>
-            </a:r>
-          </a:p>
-          <a:p>
-            <a:r>
-              <a:rPr lang="pt-PT" dirty="0"/>
-              <a:t>Compatibilidade na Internet</a:t>
-            </a:r>
-          </a:p>
-        </p:txBody>
-      </p:sp>
-      <p:sp>
-        <p:nvSpPr>
-          <p:cNvPr id="4" name="Marcador de Posição de Conteúdo 2">
-            <a:extLst>
-              <a:ext uri="{FF2B5EF4-FFF2-40B4-BE49-F238E27FC236}">
-                <a16:creationId xmlns:a16="http://schemas.microsoft.com/office/drawing/2014/main" id="{92CFAAB8-82E9-6F73-6CC3-681D1C6495C1}"/>
-              </a:ext>
-            </a:extLst>
-          </p:cNvPr>
-          <p:cNvSpPr txBox="1">
-            <a:spLocks/>
-          </p:cNvSpPr>
-          <p:nvPr/>
-        </p:nvSpPr>
-        <p:spPr>
-          <a:xfrm>
-            <a:off x="4876800" y="2015731"/>
-            <a:ext cx="3425221" cy="3450613"/>
-          </a:xfrm>
-          <a:prstGeom prst="rect">
-            <a:avLst/>
-          </a:prstGeom>
-        </p:spPr>
-        <p:txBody>
-          <a:bodyPr vert="horz" lIns="91440" tIns="45720" rIns="91440" bIns="45720" rtlCol="0" anchor="t">
-            <a:normAutofit/>
-          </a:bodyPr>
-          <a:lstStyle>
-            <a:lvl1pPr marL="228600" indent="-228600" algn="l" defTabSz="914400" rtl="0" eaLnBrk="1" latinLnBrk="0" hangingPunct="1">
-              <a:lnSpc>
-                <a:spcPct val="120000"/>
-              </a:lnSpc>
-              <a:spcBef>
-                <a:spcPts val="1000"/>
-              </a:spcBef>
-              <a:buClr>
-                <a:schemeClr val="accent1"/>
-              </a:buClr>
-              <a:buSzPct val="100000"/>
-              <a:buFont typeface="Arial" panose="020B0604020202020204" pitchFamily="34" charset="0"/>
-              <a:buChar char="•"/>
-              <a:defRPr sz="2000" kern="1200">
-                <a:solidFill>
-                  <a:schemeClr val="tx1"/>
-                </a:solidFill>
-                <a:effectLst/>
-                <a:latin typeface="+mn-lt"/>
-                <a:ea typeface="+mn-ea"/>
-                <a:cs typeface="+mn-cs"/>
-              </a:defRPr>
-            </a:lvl1pPr>
-            <a:lvl2pPr marL="685800" indent="-228600" algn="l" defTabSz="914400" rtl="0" eaLnBrk="1" latinLnBrk="0" hangingPunct="1">
-              <a:lnSpc>
-                <a:spcPct val="120000"/>
-              </a:lnSpc>
-              <a:spcBef>
-                <a:spcPts val="500"/>
-              </a:spcBef>
-              <a:buClr>
-                <a:schemeClr val="accent1"/>
-              </a:buClr>
-              <a:buSzPct val="100000"/>
-              <a:buFont typeface="Arial" panose="020B0604020202020204" pitchFamily="34" charset="0"/>
-              <a:buChar char="•"/>
-              <a:defRPr sz="1800" kern="1200" cap="none" baseline="0">
-                <a:solidFill>
-                  <a:schemeClr val="tx1"/>
-                </a:solidFill>
-                <a:effectLst/>
-                <a:latin typeface="+mn-lt"/>
-                <a:ea typeface="+mn-ea"/>
-                <a:cs typeface="+mn-cs"/>
-              </a:defRPr>
-            </a:lvl2pPr>
-            <a:lvl3pPr marL="1143000" indent="-228600" algn="l" defTabSz="914400" rtl="0" eaLnBrk="1" latinLnBrk="0" hangingPunct="1">
-              <a:lnSpc>
-                <a:spcPct val="120000"/>
-              </a:lnSpc>
-              <a:spcBef>
-                <a:spcPts val="500"/>
-              </a:spcBef>
-              <a:buClr>
-                <a:schemeClr val="accent1"/>
-              </a:buClr>
-              <a:buSzPct val="100000"/>
-              <a:buFont typeface="Arial" panose="020B0604020202020204" pitchFamily="34" charset="0"/>
-              <a:buChar char="•"/>
-              <a:defRPr sz="1600" kern="1200">
-                <a:solidFill>
-                  <a:schemeClr val="tx1"/>
-                </a:solidFill>
-                <a:effectLst/>
-                <a:latin typeface="+mn-lt"/>
-                <a:ea typeface="+mn-ea"/>
-                <a:cs typeface="+mn-cs"/>
-              </a:defRPr>
-            </a:lvl3pPr>
-            <a:lvl4pPr marL="1600200" indent="-228600" algn="l" defTabSz="914400" rtl="0" eaLnBrk="1" latinLnBrk="0" hangingPunct="1">
-              <a:lnSpc>
-                <a:spcPct val="120000"/>
-              </a:lnSpc>
-              <a:spcBef>
-                <a:spcPts val="500"/>
-              </a:spcBef>
-              <a:buClr>
-                <a:schemeClr val="accent1"/>
-              </a:buClr>
-              <a:buSzPct val="100000"/>
-              <a:buFont typeface="Arial" panose="020B0604020202020204" pitchFamily="34" charset="0"/>
-              <a:buChar char="•"/>
-              <a:defRPr sz="1400" kern="1200" cap="none" baseline="0">
-                <a:solidFill>
-                  <a:schemeClr val="tx1"/>
-                </a:solidFill>
-                <a:effectLst/>
-                <a:latin typeface="+mn-lt"/>
-                <a:ea typeface="+mn-ea"/>
-                <a:cs typeface="+mn-cs"/>
-              </a:defRPr>
-            </a:lvl4pPr>
-            <a:lvl5pPr marL="2057400" indent="-228600" algn="l" defTabSz="914400" rtl="0" eaLnBrk="1" latinLnBrk="0" hangingPunct="1">
-              <a:lnSpc>
-                <a:spcPct val="120000"/>
-              </a:lnSpc>
-              <a:spcBef>
-                <a:spcPts val="500"/>
-              </a:spcBef>
-              <a:buClr>
-                <a:schemeClr val="accent1"/>
-              </a:buClr>
-              <a:buSzPct val="100000"/>
-              <a:buFont typeface="Arial" panose="020B0604020202020204" pitchFamily="34" charset="0"/>
-              <a:buChar char="•"/>
-              <a:defRPr sz="1200" kern="1200">
-                <a:solidFill>
-                  <a:schemeClr val="tx1"/>
-                </a:solidFill>
-                <a:effectLst/>
-                <a:latin typeface="+mn-lt"/>
-                <a:ea typeface="+mn-ea"/>
-                <a:cs typeface="+mn-cs"/>
-              </a:defRPr>
-            </a:lvl5pPr>
-            <a:lvl6pPr marL="2514600" indent="-228600" algn="l" defTabSz="914400" rtl="0" eaLnBrk="1" latinLnBrk="0" hangingPunct="1">
-              <a:lnSpc>
-                <a:spcPct val="120000"/>
-              </a:lnSpc>
-              <a:spcBef>
-                <a:spcPts val="500"/>
-              </a:spcBef>
-              <a:buClr>
-                <a:schemeClr val="accent1"/>
-              </a:buClr>
-              <a:buSzPct val="100000"/>
-              <a:buFont typeface="Arial" panose="020B0604020202020204" pitchFamily="34" charset="0"/>
-              <a:buChar char="•"/>
-              <a:defRPr sz="1200" kern="1200">
-                <a:solidFill>
-                  <a:schemeClr val="tx1"/>
-                </a:solidFill>
-                <a:effectLst/>
-                <a:latin typeface="+mn-lt"/>
-                <a:ea typeface="+mn-ea"/>
-                <a:cs typeface="+mn-cs"/>
-              </a:defRPr>
-            </a:lvl6pPr>
-            <a:lvl7pPr marL="2971800" indent="-228600" algn="l" defTabSz="914400" rtl="0" eaLnBrk="1" latinLnBrk="0" hangingPunct="1">
-              <a:lnSpc>
-                <a:spcPct val="120000"/>
-              </a:lnSpc>
-              <a:spcBef>
-                <a:spcPts val="500"/>
-              </a:spcBef>
-              <a:buClr>
-                <a:schemeClr val="accent1"/>
-              </a:buClr>
-              <a:buSzPct val="100000"/>
-              <a:buFont typeface="Arial" panose="020B0604020202020204" pitchFamily="34" charset="0"/>
-              <a:buChar char="•"/>
-              <a:defRPr sz="1200" kern="1200">
-                <a:solidFill>
-                  <a:schemeClr val="tx1"/>
-                </a:solidFill>
-                <a:effectLst/>
-                <a:latin typeface="+mn-lt"/>
-                <a:ea typeface="+mn-ea"/>
-                <a:cs typeface="+mn-cs"/>
-              </a:defRPr>
-            </a:lvl7pPr>
-            <a:lvl8pPr marL="3429000" indent="-228600" algn="l" defTabSz="914400" rtl="0" eaLnBrk="1" latinLnBrk="0" hangingPunct="1">
-              <a:lnSpc>
-                <a:spcPct val="120000"/>
-              </a:lnSpc>
-              <a:spcBef>
-                <a:spcPts val="500"/>
-              </a:spcBef>
-              <a:buClr>
-                <a:schemeClr val="accent1"/>
-              </a:buClr>
-              <a:buSzPct val="100000"/>
-              <a:buFont typeface="Arial" panose="020B0604020202020204" pitchFamily="34" charset="0"/>
-              <a:buChar char="•"/>
-              <a:defRPr sz="1200" kern="1200" baseline="0">
-                <a:solidFill>
-                  <a:schemeClr val="tx1"/>
-                </a:solidFill>
-                <a:effectLst/>
-                <a:latin typeface="+mn-lt"/>
-                <a:ea typeface="+mn-ea"/>
-                <a:cs typeface="+mn-cs"/>
-              </a:defRPr>
-            </a:lvl8pPr>
-            <a:lvl9pPr marL="3886200" indent="-228600" algn="l" defTabSz="914400" rtl="0" eaLnBrk="1" latinLnBrk="0" hangingPunct="1">
-              <a:lnSpc>
-                <a:spcPct val="120000"/>
-              </a:lnSpc>
-              <a:spcBef>
-                <a:spcPts val="500"/>
-              </a:spcBef>
-              <a:buClr>
-                <a:schemeClr val="accent1"/>
-              </a:buClr>
-              <a:buSzPct val="100000"/>
-              <a:buFont typeface="Arial" panose="020B0604020202020204" pitchFamily="34" charset="0"/>
-              <a:buChar char="•"/>
-              <a:defRPr sz="1200" kern="1200" baseline="0">
-                <a:solidFill>
-                  <a:schemeClr val="tx1"/>
-                </a:solidFill>
-                <a:effectLst/>
-                <a:latin typeface="+mn-lt"/>
-                <a:ea typeface="+mn-ea"/>
-                <a:cs typeface="+mn-cs"/>
-              </a:defRPr>
-            </a:lvl9pPr>
-          </a:lstStyle>
-          <a:p>
-            <a:pPr marL="0" indent="0">
-              <a:buFont typeface="Arial" panose="020B0604020202020204" pitchFamily="34" charset="0"/>
-              <a:buNone/>
-            </a:pPr>
-            <a:r>
-              <a:rPr lang="pt-PT" dirty="0"/>
-              <a:t>Desempenho:</a:t>
-            </a:r>
-          </a:p>
-          <a:p>
-            <a:r>
-              <a:rPr lang="pt-PT" dirty="0"/>
-              <a:t>Rápida Autenticação</a:t>
-            </a:r>
-          </a:p>
-          <a:p>
-            <a:r>
-              <a:rPr lang="pt-PT" dirty="0"/>
-              <a:t>Navegabilidade Rápida</a:t>
-            </a:r>
-          </a:p>
-          <a:p>
-            <a:r>
-              <a:rPr lang="pt-PT" dirty="0"/>
-              <a:t>Escalabilidade da Plataforma</a:t>
-            </a:r>
-          </a:p>
-        </p:txBody>
-      </p:sp>
-      <p:sp>
-        <p:nvSpPr>
-          <p:cNvPr id="5" name="Marcador de Posição de Conteúdo 2">
-            <a:extLst>
-              <a:ext uri="{FF2B5EF4-FFF2-40B4-BE49-F238E27FC236}">
-                <a16:creationId xmlns:a16="http://schemas.microsoft.com/office/drawing/2014/main" id="{523D7428-4450-98A4-7C9A-A059F73C4BBB}"/>
-              </a:ext>
-            </a:extLst>
-          </p:cNvPr>
-          <p:cNvSpPr txBox="1">
-            <a:spLocks/>
-          </p:cNvSpPr>
-          <p:nvPr/>
-        </p:nvSpPr>
-        <p:spPr>
-          <a:xfrm>
-            <a:off x="8302021" y="2015731"/>
-            <a:ext cx="3425221" cy="3450613"/>
-          </a:xfrm>
-          <a:prstGeom prst="rect">
-            <a:avLst/>
-          </a:prstGeom>
-        </p:spPr>
-        <p:txBody>
-          <a:bodyPr vert="horz" lIns="91440" tIns="45720" rIns="91440" bIns="45720" rtlCol="0" anchor="t">
-            <a:normAutofit/>
-          </a:bodyPr>
-          <a:lstStyle>
-            <a:lvl1pPr marL="228600" indent="-228600" algn="l" defTabSz="914400" rtl="0" eaLnBrk="1" latinLnBrk="0" hangingPunct="1">
-              <a:lnSpc>
-                <a:spcPct val="120000"/>
-              </a:lnSpc>
-              <a:spcBef>
-                <a:spcPts val="1000"/>
-              </a:spcBef>
-              <a:buClr>
-                <a:schemeClr val="accent1"/>
-              </a:buClr>
-              <a:buSzPct val="100000"/>
-              <a:buFont typeface="Arial" panose="020B0604020202020204" pitchFamily="34" charset="0"/>
-              <a:buChar char="•"/>
-              <a:defRPr sz="2000" kern="1200">
-                <a:solidFill>
-                  <a:schemeClr val="tx1"/>
-                </a:solidFill>
-                <a:effectLst/>
-                <a:latin typeface="+mn-lt"/>
-                <a:ea typeface="+mn-ea"/>
-                <a:cs typeface="+mn-cs"/>
-              </a:defRPr>
-            </a:lvl1pPr>
-            <a:lvl2pPr marL="685800" indent="-228600" algn="l" defTabSz="914400" rtl="0" eaLnBrk="1" latinLnBrk="0" hangingPunct="1">
-              <a:lnSpc>
-                <a:spcPct val="120000"/>
-              </a:lnSpc>
-              <a:spcBef>
-                <a:spcPts val="500"/>
-              </a:spcBef>
-              <a:buClr>
-                <a:schemeClr val="accent1"/>
-              </a:buClr>
-              <a:buSzPct val="100000"/>
-              <a:buFont typeface="Arial" panose="020B0604020202020204" pitchFamily="34" charset="0"/>
-              <a:buChar char="•"/>
-              <a:defRPr sz="1800" kern="1200" cap="none" baseline="0">
-                <a:solidFill>
-                  <a:schemeClr val="tx1"/>
-                </a:solidFill>
-                <a:effectLst/>
-                <a:latin typeface="+mn-lt"/>
-                <a:ea typeface="+mn-ea"/>
-                <a:cs typeface="+mn-cs"/>
-              </a:defRPr>
-            </a:lvl2pPr>
-            <a:lvl3pPr marL="1143000" indent="-228600" algn="l" defTabSz="914400" rtl="0" eaLnBrk="1" latinLnBrk="0" hangingPunct="1">
-              <a:lnSpc>
-                <a:spcPct val="120000"/>
-              </a:lnSpc>
-              <a:spcBef>
-                <a:spcPts val="500"/>
-              </a:spcBef>
-              <a:buClr>
-                <a:schemeClr val="accent1"/>
-              </a:buClr>
-              <a:buSzPct val="100000"/>
-              <a:buFont typeface="Arial" panose="020B0604020202020204" pitchFamily="34" charset="0"/>
-              <a:buChar char="•"/>
-              <a:defRPr sz="1600" kern="1200">
-                <a:solidFill>
-                  <a:schemeClr val="tx1"/>
-                </a:solidFill>
-                <a:effectLst/>
-                <a:latin typeface="+mn-lt"/>
-                <a:ea typeface="+mn-ea"/>
-                <a:cs typeface="+mn-cs"/>
-              </a:defRPr>
-            </a:lvl3pPr>
-            <a:lvl4pPr marL="1600200" indent="-228600" algn="l" defTabSz="914400" rtl="0" eaLnBrk="1" latinLnBrk="0" hangingPunct="1">
-              <a:lnSpc>
-                <a:spcPct val="120000"/>
-              </a:lnSpc>
-              <a:spcBef>
-                <a:spcPts val="500"/>
-              </a:spcBef>
-              <a:buClr>
-                <a:schemeClr val="accent1"/>
-              </a:buClr>
-              <a:buSzPct val="100000"/>
-              <a:buFont typeface="Arial" panose="020B0604020202020204" pitchFamily="34" charset="0"/>
-              <a:buChar char="•"/>
-              <a:defRPr sz="1400" kern="1200" cap="none" baseline="0">
-                <a:solidFill>
-                  <a:schemeClr val="tx1"/>
-                </a:solidFill>
-                <a:effectLst/>
-                <a:latin typeface="+mn-lt"/>
-                <a:ea typeface="+mn-ea"/>
-                <a:cs typeface="+mn-cs"/>
-              </a:defRPr>
-            </a:lvl4pPr>
-            <a:lvl5pPr marL="2057400" indent="-228600" algn="l" defTabSz="914400" rtl="0" eaLnBrk="1" latinLnBrk="0" hangingPunct="1">
-              <a:lnSpc>
-                <a:spcPct val="120000"/>
-              </a:lnSpc>
-              <a:spcBef>
-                <a:spcPts val="500"/>
-              </a:spcBef>
-              <a:buClr>
-                <a:schemeClr val="accent1"/>
-              </a:buClr>
-              <a:buSzPct val="100000"/>
-              <a:buFont typeface="Arial" panose="020B0604020202020204" pitchFamily="34" charset="0"/>
-              <a:buChar char="•"/>
-              <a:defRPr sz="1200" kern="1200">
-                <a:solidFill>
-                  <a:schemeClr val="tx1"/>
-                </a:solidFill>
-                <a:effectLst/>
-                <a:latin typeface="+mn-lt"/>
-                <a:ea typeface="+mn-ea"/>
-                <a:cs typeface="+mn-cs"/>
-              </a:defRPr>
-            </a:lvl5pPr>
-            <a:lvl6pPr marL="2514600" indent="-228600" algn="l" defTabSz="914400" rtl="0" eaLnBrk="1" latinLnBrk="0" hangingPunct="1">
-              <a:lnSpc>
-                <a:spcPct val="120000"/>
-              </a:lnSpc>
-              <a:spcBef>
-                <a:spcPts val="500"/>
-              </a:spcBef>
-              <a:buClr>
-                <a:schemeClr val="accent1"/>
-              </a:buClr>
-              <a:buSzPct val="100000"/>
-              <a:buFont typeface="Arial" panose="020B0604020202020204" pitchFamily="34" charset="0"/>
-              <a:buChar char="•"/>
-              <a:defRPr sz="1200" kern="1200">
-                <a:solidFill>
-                  <a:schemeClr val="tx1"/>
-                </a:solidFill>
-                <a:effectLst/>
-                <a:latin typeface="+mn-lt"/>
-                <a:ea typeface="+mn-ea"/>
-                <a:cs typeface="+mn-cs"/>
-              </a:defRPr>
-            </a:lvl6pPr>
-            <a:lvl7pPr marL="2971800" indent="-228600" algn="l" defTabSz="914400" rtl="0" eaLnBrk="1" latinLnBrk="0" hangingPunct="1">
-              <a:lnSpc>
-                <a:spcPct val="120000"/>
-              </a:lnSpc>
-              <a:spcBef>
-                <a:spcPts val="500"/>
-              </a:spcBef>
-              <a:buClr>
-                <a:schemeClr val="accent1"/>
-              </a:buClr>
-              <a:buSzPct val="100000"/>
-              <a:buFont typeface="Arial" panose="020B0604020202020204" pitchFamily="34" charset="0"/>
-              <a:buChar char="•"/>
-              <a:defRPr sz="1200" kern="1200">
-                <a:solidFill>
-                  <a:schemeClr val="tx1"/>
-                </a:solidFill>
-                <a:effectLst/>
-                <a:latin typeface="+mn-lt"/>
-                <a:ea typeface="+mn-ea"/>
-                <a:cs typeface="+mn-cs"/>
-              </a:defRPr>
-            </a:lvl7pPr>
-            <a:lvl8pPr marL="3429000" indent="-228600" algn="l" defTabSz="914400" rtl="0" eaLnBrk="1" latinLnBrk="0" hangingPunct="1">
-              <a:lnSpc>
-                <a:spcPct val="120000"/>
-              </a:lnSpc>
-              <a:spcBef>
-                <a:spcPts val="500"/>
-              </a:spcBef>
-              <a:buClr>
-                <a:schemeClr val="accent1"/>
-              </a:buClr>
-              <a:buSzPct val="100000"/>
-              <a:buFont typeface="Arial" panose="020B0604020202020204" pitchFamily="34" charset="0"/>
-              <a:buChar char="•"/>
-              <a:defRPr sz="1200" kern="1200" baseline="0">
-                <a:solidFill>
-                  <a:schemeClr val="tx1"/>
-                </a:solidFill>
-                <a:effectLst/>
-                <a:latin typeface="+mn-lt"/>
-                <a:ea typeface="+mn-ea"/>
-                <a:cs typeface="+mn-cs"/>
-              </a:defRPr>
-            </a:lvl8pPr>
-            <a:lvl9pPr marL="3886200" indent="-228600" algn="l" defTabSz="914400" rtl="0" eaLnBrk="1" latinLnBrk="0" hangingPunct="1">
-              <a:lnSpc>
-                <a:spcPct val="120000"/>
-              </a:lnSpc>
-              <a:spcBef>
-                <a:spcPts val="500"/>
-              </a:spcBef>
-              <a:buClr>
-                <a:schemeClr val="accent1"/>
-              </a:buClr>
-              <a:buSzPct val="100000"/>
-              <a:buFont typeface="Arial" panose="020B0604020202020204" pitchFamily="34" charset="0"/>
-              <a:buChar char="•"/>
-              <a:defRPr sz="1200" kern="1200" baseline="0">
-                <a:solidFill>
-                  <a:schemeClr val="tx1"/>
-                </a:solidFill>
-                <a:effectLst/>
-                <a:latin typeface="+mn-lt"/>
-                <a:ea typeface="+mn-ea"/>
-                <a:cs typeface="+mn-cs"/>
-              </a:defRPr>
-            </a:lvl9pPr>
-          </a:lstStyle>
-          <a:p>
-            <a:pPr marL="0" indent="0">
-              <a:buFont typeface="Arial" panose="020B0604020202020204" pitchFamily="34" charset="0"/>
-              <a:buNone/>
-            </a:pPr>
-            <a:r>
-              <a:rPr lang="pt-PT" dirty="0"/>
-              <a:t>Segurança:</a:t>
-            </a:r>
-          </a:p>
-          <a:p>
-            <a:r>
-              <a:rPr lang="pt-PT" dirty="0"/>
-              <a:t>Deteção de inatividade</a:t>
-            </a:r>
-          </a:p>
-          <a:p>
-            <a:r>
-              <a:rPr lang="pt-PT" dirty="0"/>
-              <a:t>Uso de 2FA</a:t>
-            </a:r>
-          </a:p>
-          <a:p>
-            <a:r>
-              <a:rPr lang="pt-PT" dirty="0"/>
-              <a:t>Sem registos de mensagens</a:t>
+              <a:t>Os utilizadores devem ser capazes de importar os extratos de outros bancos sem qualquer tipo de adaptação nos mesmos</a:t>
             </a:r>
           </a:p>
         </p:txBody>
@@ -8402,10 +8126,10 @@
       </p:sp>
       <p:sp>
         <p:nvSpPr>
-          <p:cNvPr id="3" name="Marcador de Posição de Conteúdo 2">
+          <p:cNvPr id="7" name="Marcador de Posição de Conteúdo 6">
             <a:extLst>
               <a:ext uri="{FF2B5EF4-FFF2-40B4-BE49-F238E27FC236}">
-                <a16:creationId xmlns:a16="http://schemas.microsoft.com/office/drawing/2014/main" id="{E82AFDAC-88B1-3AB9-A268-4DF9CBD41DFE}"/>
+                <a16:creationId xmlns:a16="http://schemas.microsoft.com/office/drawing/2014/main" id="{4CDF2A1F-BDE4-7ECC-7CEB-42822AAE7A2D}"/>
               </a:ext>
             </a:extLst>
           </p:cNvPr>
@@ -8418,570 +8142,29 @@
         </p:nvSpPr>
         <p:spPr>
           <a:xfrm>
-            <a:off x="1451579" y="2015732"/>
-            <a:ext cx="3425221" cy="3450613"/>
+            <a:off x="1451579" y="2106386"/>
+            <a:ext cx="9603275" cy="3359959"/>
           </a:xfrm>
         </p:spPr>
         <p:txBody>
           <a:bodyPr/>
           <a:lstStyle/>
           <a:p>
-            <a:pPr marL="0" indent="0">
-              <a:buNone/>
-            </a:pPr>
             <a:r>
               <a:rPr lang="pt-PT" dirty="0"/>
-              <a:t>Interface e Usabilidade:</a:t>
+              <a:t>Apenas será possível importar os extratos de uma reduzida quantidade de bancos</a:t>
             </a:r>
           </a:p>
           <a:p>
             <a:r>
               <a:rPr lang="pt-PT" dirty="0"/>
-              <a:t>Navegabilidade Livre</a:t>
+              <a:t>De forma a aumentar a segurança dos utilizadores e dos seus dados, o utilizador terá de interagir pelo menos 1 vez a cada 10 minutos com a plataforma, senão a sua sessão será revogada</a:t>
             </a:r>
           </a:p>
           <a:p>
             <a:r>
               <a:rPr lang="pt-PT" dirty="0"/>
-              <a:t>Facilidade de Uso</a:t>
-            </a:r>
-          </a:p>
-          <a:p>
-            <a:r>
-              <a:rPr lang="pt-PT" dirty="0"/>
-              <a:t>Compatibilidade na Internet</a:t>
-            </a:r>
-          </a:p>
-        </p:txBody>
-      </p:sp>
-      <p:sp>
-        <p:nvSpPr>
-          <p:cNvPr id="4" name="Marcador de Posição de Conteúdo 2">
-            <a:extLst>
-              <a:ext uri="{FF2B5EF4-FFF2-40B4-BE49-F238E27FC236}">
-                <a16:creationId xmlns:a16="http://schemas.microsoft.com/office/drawing/2014/main" id="{92CFAAB8-82E9-6F73-6CC3-681D1C6495C1}"/>
-              </a:ext>
-            </a:extLst>
-          </p:cNvPr>
-          <p:cNvSpPr txBox="1">
-            <a:spLocks/>
-          </p:cNvSpPr>
-          <p:nvPr/>
-        </p:nvSpPr>
-        <p:spPr>
-          <a:xfrm>
-            <a:off x="4876800" y="2015731"/>
-            <a:ext cx="3425221" cy="3450613"/>
-          </a:xfrm>
-          <a:prstGeom prst="rect">
-            <a:avLst/>
-          </a:prstGeom>
-        </p:spPr>
-        <p:txBody>
-          <a:bodyPr vert="horz" lIns="91440" tIns="45720" rIns="91440" bIns="45720" rtlCol="0" anchor="t">
-            <a:normAutofit/>
-          </a:bodyPr>
-          <a:lstStyle>
-            <a:lvl1pPr marL="228600" indent="-228600" algn="l" defTabSz="914400" rtl="0" eaLnBrk="1" latinLnBrk="0" hangingPunct="1">
-              <a:lnSpc>
-                <a:spcPct val="120000"/>
-              </a:lnSpc>
-              <a:spcBef>
-                <a:spcPts val="1000"/>
-              </a:spcBef>
-              <a:buClr>
-                <a:schemeClr val="accent1"/>
-              </a:buClr>
-              <a:buSzPct val="100000"/>
-              <a:buFont typeface="Arial" panose="020B0604020202020204" pitchFamily="34" charset="0"/>
-              <a:buChar char="•"/>
-              <a:defRPr sz="2000" kern="1200">
-                <a:solidFill>
-                  <a:schemeClr val="tx1"/>
-                </a:solidFill>
-                <a:effectLst/>
-                <a:latin typeface="+mn-lt"/>
-                <a:ea typeface="+mn-ea"/>
-                <a:cs typeface="+mn-cs"/>
-              </a:defRPr>
-            </a:lvl1pPr>
-            <a:lvl2pPr marL="685800" indent="-228600" algn="l" defTabSz="914400" rtl="0" eaLnBrk="1" latinLnBrk="0" hangingPunct="1">
-              <a:lnSpc>
-                <a:spcPct val="120000"/>
-              </a:lnSpc>
-              <a:spcBef>
-                <a:spcPts val="500"/>
-              </a:spcBef>
-              <a:buClr>
-                <a:schemeClr val="accent1"/>
-              </a:buClr>
-              <a:buSzPct val="100000"/>
-              <a:buFont typeface="Arial" panose="020B0604020202020204" pitchFamily="34" charset="0"/>
-              <a:buChar char="•"/>
-              <a:defRPr sz="1800" kern="1200" cap="none" baseline="0">
-                <a:solidFill>
-                  <a:schemeClr val="tx1"/>
-                </a:solidFill>
-                <a:effectLst/>
-                <a:latin typeface="+mn-lt"/>
-                <a:ea typeface="+mn-ea"/>
-                <a:cs typeface="+mn-cs"/>
-              </a:defRPr>
-            </a:lvl2pPr>
-            <a:lvl3pPr marL="1143000" indent="-228600" algn="l" defTabSz="914400" rtl="0" eaLnBrk="1" latinLnBrk="0" hangingPunct="1">
-              <a:lnSpc>
-                <a:spcPct val="120000"/>
-              </a:lnSpc>
-              <a:spcBef>
-                <a:spcPts val="500"/>
-              </a:spcBef>
-              <a:buClr>
-                <a:schemeClr val="accent1"/>
-              </a:buClr>
-              <a:buSzPct val="100000"/>
-              <a:buFont typeface="Arial" panose="020B0604020202020204" pitchFamily="34" charset="0"/>
-              <a:buChar char="•"/>
-              <a:defRPr sz="1600" kern="1200">
-                <a:solidFill>
-                  <a:schemeClr val="tx1"/>
-                </a:solidFill>
-                <a:effectLst/>
-                <a:latin typeface="+mn-lt"/>
-                <a:ea typeface="+mn-ea"/>
-                <a:cs typeface="+mn-cs"/>
-              </a:defRPr>
-            </a:lvl3pPr>
-            <a:lvl4pPr marL="1600200" indent="-228600" algn="l" defTabSz="914400" rtl="0" eaLnBrk="1" latinLnBrk="0" hangingPunct="1">
-              <a:lnSpc>
-                <a:spcPct val="120000"/>
-              </a:lnSpc>
-              <a:spcBef>
-                <a:spcPts val="500"/>
-              </a:spcBef>
-              <a:buClr>
-                <a:schemeClr val="accent1"/>
-              </a:buClr>
-              <a:buSzPct val="100000"/>
-              <a:buFont typeface="Arial" panose="020B0604020202020204" pitchFamily="34" charset="0"/>
-              <a:buChar char="•"/>
-              <a:defRPr sz="1400" kern="1200" cap="none" baseline="0">
-                <a:solidFill>
-                  <a:schemeClr val="tx1"/>
-                </a:solidFill>
-                <a:effectLst/>
-                <a:latin typeface="+mn-lt"/>
-                <a:ea typeface="+mn-ea"/>
-                <a:cs typeface="+mn-cs"/>
-              </a:defRPr>
-            </a:lvl4pPr>
-            <a:lvl5pPr marL="2057400" indent="-228600" algn="l" defTabSz="914400" rtl="0" eaLnBrk="1" latinLnBrk="0" hangingPunct="1">
-              <a:lnSpc>
-                <a:spcPct val="120000"/>
-              </a:lnSpc>
-              <a:spcBef>
-                <a:spcPts val="500"/>
-              </a:spcBef>
-              <a:buClr>
-                <a:schemeClr val="accent1"/>
-              </a:buClr>
-              <a:buSzPct val="100000"/>
-              <a:buFont typeface="Arial" panose="020B0604020202020204" pitchFamily="34" charset="0"/>
-              <a:buChar char="•"/>
-              <a:defRPr sz="1200" kern="1200">
-                <a:solidFill>
-                  <a:schemeClr val="tx1"/>
-                </a:solidFill>
-                <a:effectLst/>
-                <a:latin typeface="+mn-lt"/>
-                <a:ea typeface="+mn-ea"/>
-                <a:cs typeface="+mn-cs"/>
-              </a:defRPr>
-            </a:lvl5pPr>
-            <a:lvl6pPr marL="2514600" indent="-228600" algn="l" defTabSz="914400" rtl="0" eaLnBrk="1" latinLnBrk="0" hangingPunct="1">
-              <a:lnSpc>
-                <a:spcPct val="120000"/>
-              </a:lnSpc>
-              <a:spcBef>
-                <a:spcPts val="500"/>
-              </a:spcBef>
-              <a:buClr>
-                <a:schemeClr val="accent1"/>
-              </a:buClr>
-              <a:buSzPct val="100000"/>
-              <a:buFont typeface="Arial" panose="020B0604020202020204" pitchFamily="34" charset="0"/>
-              <a:buChar char="•"/>
-              <a:defRPr sz="1200" kern="1200">
-                <a:solidFill>
-                  <a:schemeClr val="tx1"/>
-                </a:solidFill>
-                <a:effectLst/>
-                <a:latin typeface="+mn-lt"/>
-                <a:ea typeface="+mn-ea"/>
-                <a:cs typeface="+mn-cs"/>
-              </a:defRPr>
-            </a:lvl6pPr>
-            <a:lvl7pPr marL="2971800" indent="-228600" algn="l" defTabSz="914400" rtl="0" eaLnBrk="1" latinLnBrk="0" hangingPunct="1">
-              <a:lnSpc>
-                <a:spcPct val="120000"/>
-              </a:lnSpc>
-              <a:spcBef>
-                <a:spcPts val="500"/>
-              </a:spcBef>
-              <a:buClr>
-                <a:schemeClr val="accent1"/>
-              </a:buClr>
-              <a:buSzPct val="100000"/>
-              <a:buFont typeface="Arial" panose="020B0604020202020204" pitchFamily="34" charset="0"/>
-              <a:buChar char="•"/>
-              <a:defRPr sz="1200" kern="1200">
-                <a:solidFill>
-                  <a:schemeClr val="tx1"/>
-                </a:solidFill>
-                <a:effectLst/>
-                <a:latin typeface="+mn-lt"/>
-                <a:ea typeface="+mn-ea"/>
-                <a:cs typeface="+mn-cs"/>
-              </a:defRPr>
-            </a:lvl7pPr>
-            <a:lvl8pPr marL="3429000" indent="-228600" algn="l" defTabSz="914400" rtl="0" eaLnBrk="1" latinLnBrk="0" hangingPunct="1">
-              <a:lnSpc>
-                <a:spcPct val="120000"/>
-              </a:lnSpc>
-              <a:spcBef>
-                <a:spcPts val="500"/>
-              </a:spcBef>
-              <a:buClr>
-                <a:schemeClr val="accent1"/>
-              </a:buClr>
-              <a:buSzPct val="100000"/>
-              <a:buFont typeface="Arial" panose="020B0604020202020204" pitchFamily="34" charset="0"/>
-              <a:buChar char="•"/>
-              <a:defRPr sz="1200" kern="1200" baseline="0">
-                <a:solidFill>
-                  <a:schemeClr val="tx1"/>
-                </a:solidFill>
-                <a:effectLst/>
-                <a:latin typeface="+mn-lt"/>
-                <a:ea typeface="+mn-ea"/>
-                <a:cs typeface="+mn-cs"/>
-              </a:defRPr>
-            </a:lvl8pPr>
-            <a:lvl9pPr marL="3886200" indent="-228600" algn="l" defTabSz="914400" rtl="0" eaLnBrk="1" latinLnBrk="0" hangingPunct="1">
-              <a:lnSpc>
-                <a:spcPct val="120000"/>
-              </a:lnSpc>
-              <a:spcBef>
-                <a:spcPts val="500"/>
-              </a:spcBef>
-              <a:buClr>
-                <a:schemeClr val="accent1"/>
-              </a:buClr>
-              <a:buSzPct val="100000"/>
-              <a:buFont typeface="Arial" panose="020B0604020202020204" pitchFamily="34" charset="0"/>
-              <a:buChar char="•"/>
-              <a:defRPr sz="1200" kern="1200" baseline="0">
-                <a:solidFill>
-                  <a:schemeClr val="tx1"/>
-                </a:solidFill>
-                <a:effectLst/>
-                <a:latin typeface="+mn-lt"/>
-                <a:ea typeface="+mn-ea"/>
-                <a:cs typeface="+mn-cs"/>
-              </a:defRPr>
-            </a:lvl9pPr>
-          </a:lstStyle>
-          <a:p>
-            <a:pPr marL="0" indent="0">
-              <a:buFont typeface="Arial" panose="020B0604020202020204" pitchFamily="34" charset="0"/>
-              <a:buNone/>
-            </a:pPr>
-            <a:r>
-              <a:rPr lang="pt-PT" dirty="0"/>
-              <a:t>Desempenho:</a:t>
-            </a:r>
-          </a:p>
-          <a:p>
-            <a:r>
-              <a:rPr lang="pt-PT" dirty="0"/>
-              <a:t>Rápida Autenticação</a:t>
-            </a:r>
-          </a:p>
-          <a:p>
-            <a:r>
-              <a:rPr lang="pt-PT" dirty="0"/>
-              <a:t>Navegabilidade Rápida</a:t>
-            </a:r>
-          </a:p>
-          <a:p>
-            <a:r>
-              <a:rPr lang="pt-PT" dirty="0"/>
-              <a:t>Escalabilidade da Plataforma</a:t>
-            </a:r>
-          </a:p>
-        </p:txBody>
-      </p:sp>
-      <p:sp>
-        <p:nvSpPr>
-          <p:cNvPr id="5" name="Marcador de Posição de Conteúdo 2">
-            <a:extLst>
-              <a:ext uri="{FF2B5EF4-FFF2-40B4-BE49-F238E27FC236}">
-                <a16:creationId xmlns:a16="http://schemas.microsoft.com/office/drawing/2014/main" id="{523D7428-4450-98A4-7C9A-A059F73C4BBB}"/>
-              </a:ext>
-            </a:extLst>
-          </p:cNvPr>
-          <p:cNvSpPr txBox="1">
-            <a:spLocks/>
-          </p:cNvSpPr>
-          <p:nvPr/>
-        </p:nvSpPr>
-        <p:spPr>
-          <a:xfrm>
-            <a:off x="8302021" y="2015731"/>
-            <a:ext cx="3425221" cy="3450613"/>
-          </a:xfrm>
-          <a:prstGeom prst="rect">
-            <a:avLst/>
-          </a:prstGeom>
-        </p:spPr>
-        <p:txBody>
-          <a:bodyPr vert="horz" lIns="91440" tIns="45720" rIns="91440" bIns="45720" rtlCol="0" anchor="t">
-            <a:normAutofit/>
-          </a:bodyPr>
-          <a:lstStyle>
-            <a:lvl1pPr marL="228600" indent="-228600" algn="l" defTabSz="914400" rtl="0" eaLnBrk="1" latinLnBrk="0" hangingPunct="1">
-              <a:lnSpc>
-                <a:spcPct val="120000"/>
-              </a:lnSpc>
-              <a:spcBef>
-                <a:spcPts val="1000"/>
-              </a:spcBef>
-              <a:buClr>
-                <a:schemeClr val="accent1"/>
-              </a:buClr>
-              <a:buSzPct val="100000"/>
-              <a:buFont typeface="Arial" panose="020B0604020202020204" pitchFamily="34" charset="0"/>
-              <a:buChar char="•"/>
-              <a:defRPr sz="2000" kern="1200">
-                <a:solidFill>
-                  <a:schemeClr val="tx1"/>
-                </a:solidFill>
-                <a:effectLst/>
-                <a:latin typeface="+mn-lt"/>
-                <a:ea typeface="+mn-ea"/>
-                <a:cs typeface="+mn-cs"/>
-              </a:defRPr>
-            </a:lvl1pPr>
-            <a:lvl2pPr marL="685800" indent="-228600" algn="l" defTabSz="914400" rtl="0" eaLnBrk="1" latinLnBrk="0" hangingPunct="1">
-              <a:lnSpc>
-                <a:spcPct val="120000"/>
-              </a:lnSpc>
-              <a:spcBef>
-                <a:spcPts val="500"/>
-              </a:spcBef>
-              <a:buClr>
-                <a:schemeClr val="accent1"/>
-              </a:buClr>
-              <a:buSzPct val="100000"/>
-              <a:buFont typeface="Arial" panose="020B0604020202020204" pitchFamily="34" charset="0"/>
-              <a:buChar char="•"/>
-              <a:defRPr sz="1800" kern="1200" cap="none" baseline="0">
-                <a:solidFill>
-                  <a:schemeClr val="tx1"/>
-                </a:solidFill>
-                <a:effectLst/>
-                <a:latin typeface="+mn-lt"/>
-                <a:ea typeface="+mn-ea"/>
-                <a:cs typeface="+mn-cs"/>
-              </a:defRPr>
-            </a:lvl2pPr>
-            <a:lvl3pPr marL="1143000" indent="-228600" algn="l" defTabSz="914400" rtl="0" eaLnBrk="1" latinLnBrk="0" hangingPunct="1">
-              <a:lnSpc>
-                <a:spcPct val="120000"/>
-              </a:lnSpc>
-              <a:spcBef>
-                <a:spcPts val="500"/>
-              </a:spcBef>
-              <a:buClr>
-                <a:schemeClr val="accent1"/>
-              </a:buClr>
-              <a:buSzPct val="100000"/>
-              <a:buFont typeface="Arial" panose="020B0604020202020204" pitchFamily="34" charset="0"/>
-              <a:buChar char="•"/>
-              <a:defRPr sz="1600" kern="1200">
-                <a:solidFill>
-                  <a:schemeClr val="tx1"/>
-                </a:solidFill>
-                <a:effectLst/>
-                <a:latin typeface="+mn-lt"/>
-                <a:ea typeface="+mn-ea"/>
-                <a:cs typeface="+mn-cs"/>
-              </a:defRPr>
-            </a:lvl3pPr>
-            <a:lvl4pPr marL="1600200" indent="-228600" algn="l" defTabSz="914400" rtl="0" eaLnBrk="1" latinLnBrk="0" hangingPunct="1">
-              <a:lnSpc>
-                <a:spcPct val="120000"/>
-              </a:lnSpc>
-              <a:spcBef>
-                <a:spcPts val="500"/>
-              </a:spcBef>
-              <a:buClr>
-                <a:schemeClr val="accent1"/>
-              </a:buClr>
-              <a:buSzPct val="100000"/>
-              <a:buFont typeface="Arial" panose="020B0604020202020204" pitchFamily="34" charset="0"/>
-              <a:buChar char="•"/>
-              <a:defRPr sz="1400" kern="1200" cap="none" baseline="0">
-                <a:solidFill>
-                  <a:schemeClr val="tx1"/>
-                </a:solidFill>
-                <a:effectLst/>
-                <a:latin typeface="+mn-lt"/>
-                <a:ea typeface="+mn-ea"/>
-                <a:cs typeface="+mn-cs"/>
-              </a:defRPr>
-            </a:lvl4pPr>
-            <a:lvl5pPr marL="2057400" indent="-228600" algn="l" defTabSz="914400" rtl="0" eaLnBrk="1" latinLnBrk="0" hangingPunct="1">
-              <a:lnSpc>
-                <a:spcPct val="120000"/>
-              </a:lnSpc>
-              <a:spcBef>
-                <a:spcPts val="500"/>
-              </a:spcBef>
-              <a:buClr>
-                <a:schemeClr val="accent1"/>
-              </a:buClr>
-              <a:buSzPct val="100000"/>
-              <a:buFont typeface="Arial" panose="020B0604020202020204" pitchFamily="34" charset="0"/>
-              <a:buChar char="•"/>
-              <a:defRPr sz="1200" kern="1200">
-                <a:solidFill>
-                  <a:schemeClr val="tx1"/>
-                </a:solidFill>
-                <a:effectLst/>
-                <a:latin typeface="+mn-lt"/>
-                <a:ea typeface="+mn-ea"/>
-                <a:cs typeface="+mn-cs"/>
-              </a:defRPr>
-            </a:lvl5pPr>
-            <a:lvl6pPr marL="2514600" indent="-228600" algn="l" defTabSz="914400" rtl="0" eaLnBrk="1" latinLnBrk="0" hangingPunct="1">
-              <a:lnSpc>
-                <a:spcPct val="120000"/>
-              </a:lnSpc>
-              <a:spcBef>
-                <a:spcPts val="500"/>
-              </a:spcBef>
-              <a:buClr>
-                <a:schemeClr val="accent1"/>
-              </a:buClr>
-              <a:buSzPct val="100000"/>
-              <a:buFont typeface="Arial" panose="020B0604020202020204" pitchFamily="34" charset="0"/>
-              <a:buChar char="•"/>
-              <a:defRPr sz="1200" kern="1200">
-                <a:solidFill>
-                  <a:schemeClr val="tx1"/>
-                </a:solidFill>
-                <a:effectLst/>
-                <a:latin typeface="+mn-lt"/>
-                <a:ea typeface="+mn-ea"/>
-                <a:cs typeface="+mn-cs"/>
-              </a:defRPr>
-            </a:lvl6pPr>
-            <a:lvl7pPr marL="2971800" indent="-228600" algn="l" defTabSz="914400" rtl="0" eaLnBrk="1" latinLnBrk="0" hangingPunct="1">
-              <a:lnSpc>
-                <a:spcPct val="120000"/>
-              </a:lnSpc>
-              <a:spcBef>
-                <a:spcPts val="500"/>
-              </a:spcBef>
-              <a:buClr>
-                <a:schemeClr val="accent1"/>
-              </a:buClr>
-              <a:buSzPct val="100000"/>
-              <a:buFont typeface="Arial" panose="020B0604020202020204" pitchFamily="34" charset="0"/>
-              <a:buChar char="•"/>
-              <a:defRPr sz="1200" kern="1200">
-                <a:solidFill>
-                  <a:schemeClr val="tx1"/>
-                </a:solidFill>
-                <a:effectLst/>
-                <a:latin typeface="+mn-lt"/>
-                <a:ea typeface="+mn-ea"/>
-                <a:cs typeface="+mn-cs"/>
-              </a:defRPr>
-            </a:lvl7pPr>
-            <a:lvl8pPr marL="3429000" indent="-228600" algn="l" defTabSz="914400" rtl="0" eaLnBrk="1" latinLnBrk="0" hangingPunct="1">
-              <a:lnSpc>
-                <a:spcPct val="120000"/>
-              </a:lnSpc>
-              <a:spcBef>
-                <a:spcPts val="500"/>
-              </a:spcBef>
-              <a:buClr>
-                <a:schemeClr val="accent1"/>
-              </a:buClr>
-              <a:buSzPct val="100000"/>
-              <a:buFont typeface="Arial" panose="020B0604020202020204" pitchFamily="34" charset="0"/>
-              <a:buChar char="•"/>
-              <a:defRPr sz="1200" kern="1200" baseline="0">
-                <a:solidFill>
-                  <a:schemeClr val="tx1"/>
-                </a:solidFill>
-                <a:effectLst/>
-                <a:latin typeface="+mn-lt"/>
-                <a:ea typeface="+mn-ea"/>
-                <a:cs typeface="+mn-cs"/>
-              </a:defRPr>
-            </a:lvl8pPr>
-            <a:lvl9pPr marL="3886200" indent="-228600" algn="l" defTabSz="914400" rtl="0" eaLnBrk="1" latinLnBrk="0" hangingPunct="1">
-              <a:lnSpc>
-                <a:spcPct val="120000"/>
-              </a:lnSpc>
-              <a:spcBef>
-                <a:spcPts val="500"/>
-              </a:spcBef>
-              <a:buClr>
-                <a:schemeClr val="accent1"/>
-              </a:buClr>
-              <a:buSzPct val="100000"/>
-              <a:buFont typeface="Arial" panose="020B0604020202020204" pitchFamily="34" charset="0"/>
-              <a:buChar char="•"/>
-              <a:defRPr sz="1200" kern="1200" baseline="0">
-                <a:solidFill>
-                  <a:schemeClr val="tx1"/>
-                </a:solidFill>
-                <a:effectLst/>
-                <a:latin typeface="+mn-lt"/>
-                <a:ea typeface="+mn-ea"/>
-                <a:cs typeface="+mn-cs"/>
-              </a:defRPr>
-            </a:lvl9pPr>
-          </a:lstStyle>
-          <a:p>
-            <a:pPr marL="0" indent="0">
-              <a:buFont typeface="Arial" panose="020B0604020202020204" pitchFamily="34" charset="0"/>
-              <a:buNone/>
-            </a:pPr>
-            <a:r>
-              <a:rPr lang="pt-PT" dirty="0"/>
-              <a:t>Segurança:</a:t>
-            </a:r>
-          </a:p>
-          <a:p>
-            <a:r>
-              <a:rPr lang="pt-PT" dirty="0"/>
-              <a:t>Deteção de inatividade</a:t>
-            </a:r>
-          </a:p>
-          <a:p>
-            <a:r>
-              <a:rPr lang="pt-PT" dirty="0"/>
-              <a:t>Uso de 2FA</a:t>
-            </a:r>
-          </a:p>
-          <a:p>
-            <a:r>
-              <a:rPr lang="pt-PT" dirty="0"/>
-              <a:t>Sem registos de mensagens</a:t>
+              <a:t>Para evitar contas duplicadas, cada nome de utilizador e email serão únicos a cada utilizador</a:t>
             </a:r>
           </a:p>
         </p:txBody>
@@ -8989,7 +8172,7 @@
     </p:spTree>
     <p:extLst>
       <p:ext uri="{BB962C8B-B14F-4D97-AF65-F5344CB8AC3E}">
-        <p14:creationId xmlns:p14="http://schemas.microsoft.com/office/powerpoint/2010/main" val="1586823910"/>
+        <p14:creationId xmlns:p14="http://schemas.microsoft.com/office/powerpoint/2010/main" val="831434331"/>
       </p:ext>
     </p:extLst>
   </p:cSld>
@@ -11704,12 +10887,11 @@
 </file>
 
 <file path=customXml/item1.xml><?xml version="1.0" encoding="utf-8"?>
-<?mso-contentType ?>
-<FormTemplates xmlns="http://schemas.microsoft.com/sharepoint/v3/contenttype/forms">
-  <Display>DocumentLibraryForm</Display>
-  <Edit>DocumentLibraryForm</Edit>
-  <New>DocumentLibraryForm</New>
-</FormTemplates>
+<p:properties xmlns:p="http://schemas.microsoft.com/office/2006/metadata/properties" xmlns:xsi="http://www.w3.org/2001/XMLSchema-instance" xmlns:pc="http://schemas.microsoft.com/office/infopath/2007/PartnerControls">
+  <documentManagement>
+    <MediaServiceKeyPoints xmlns="71af3243-3dd4-4a8d-8c0d-dd76da1f02a5" xsi:nil="true"/>
+  </documentManagement>
+</p:properties>
 </file>
 
 <file path=customXml/item2.xml><?xml version="1.0" encoding="utf-8"?>
@@ -11924,17 +11106,27 @@
 </file>
 
 <file path=customXml/item3.xml><?xml version="1.0" encoding="utf-8"?>
-<p:properties xmlns:p="http://schemas.microsoft.com/office/2006/metadata/properties" xmlns:xsi="http://www.w3.org/2001/XMLSchema-instance" xmlns:pc="http://schemas.microsoft.com/office/infopath/2007/PartnerControls">
-  <documentManagement>
-    <MediaServiceKeyPoints xmlns="71af3243-3dd4-4a8d-8c0d-dd76da1f02a5" xsi:nil="true"/>
-  </documentManagement>
-</p:properties>
+<?mso-contentType ?>
+<FormTemplates xmlns="http://schemas.microsoft.com/sharepoint/v3/contenttype/forms">
+  <Display>DocumentLibraryForm</Display>
+  <Edit>DocumentLibraryForm</Edit>
+  <New>DocumentLibraryForm</New>
+</FormTemplates>
 </file>
 
 <file path=customXml/itemProps1.xml><?xml version="1.0" encoding="utf-8"?>
-<ds:datastoreItem xmlns:ds="http://schemas.openxmlformats.org/officeDocument/2006/customXml" ds:itemID="{BCF9EC99-89FF-486C-9E02-31E13FD72E16}">
+<ds:datastoreItem xmlns:ds="http://schemas.openxmlformats.org/officeDocument/2006/customXml" ds:itemID="{0DAABB37-1599-4AE8-818C-82E84CA93DF4}">
   <ds:schemaRefs>
-    <ds:schemaRef ds:uri="http://schemas.microsoft.com/sharepoint/v3/contenttype/forms"/>
+    <ds:schemaRef ds:uri="http://purl.org/dc/elements/1.1/"/>
+    <ds:schemaRef ds:uri="http://schemas.microsoft.com/office/infopath/2007/PartnerControls"/>
+    <ds:schemaRef ds:uri="http://purl.org/dc/dcmitype/"/>
+    <ds:schemaRef ds:uri="71af3243-3dd4-4a8d-8c0d-dd76da1f02a5"/>
+    <ds:schemaRef ds:uri="16c05727-aa75-4e4a-9b5f-8a80a1165891"/>
+    <ds:schemaRef ds:uri="http://purl.org/dc/terms/"/>
+    <ds:schemaRef ds:uri="http://schemas.microsoft.com/office/2006/documentManagement/types"/>
+    <ds:schemaRef ds:uri="http://schemas.openxmlformats.org/package/2006/metadata/core-properties"/>
+    <ds:schemaRef ds:uri="http://schemas.microsoft.com/office/2006/metadata/properties"/>
+    <ds:schemaRef ds:uri="http://www.w3.org/XML/1998/namespace"/>
   </ds:schemaRefs>
 </ds:datastoreItem>
 </file>
@@ -11959,18 +11151,9 @@
 </file>
 
 <file path=customXml/itemProps3.xml><?xml version="1.0" encoding="utf-8"?>
-<ds:datastoreItem xmlns:ds="http://schemas.openxmlformats.org/officeDocument/2006/customXml" ds:itemID="{0DAABB37-1599-4AE8-818C-82E84CA93DF4}">
+<ds:datastoreItem xmlns:ds="http://schemas.openxmlformats.org/officeDocument/2006/customXml" ds:itemID="{BCF9EC99-89FF-486C-9E02-31E13FD72E16}">
   <ds:schemaRefs>
-    <ds:schemaRef ds:uri="http://purl.org/dc/elements/1.1/"/>
-    <ds:schemaRef ds:uri="http://schemas.microsoft.com/office/infopath/2007/PartnerControls"/>
-    <ds:schemaRef ds:uri="http://purl.org/dc/dcmitype/"/>
-    <ds:schemaRef ds:uri="71af3243-3dd4-4a8d-8c0d-dd76da1f02a5"/>
-    <ds:schemaRef ds:uri="16c05727-aa75-4e4a-9b5f-8a80a1165891"/>
-    <ds:schemaRef ds:uri="http://purl.org/dc/terms/"/>
-    <ds:schemaRef ds:uri="http://schemas.microsoft.com/office/2006/documentManagement/types"/>
-    <ds:schemaRef ds:uri="http://schemas.openxmlformats.org/package/2006/metadata/core-properties"/>
-    <ds:schemaRef ds:uri="http://schemas.microsoft.com/office/2006/metadata/properties"/>
-    <ds:schemaRef ds:uri="http://www.w3.org/XML/1998/namespace"/>
+    <ds:schemaRef ds:uri="http://schemas.microsoft.com/sharepoint/v3/contenttype/forms"/>
   </ds:schemaRefs>
 </ds:datastoreItem>
 </file>
</xml_diff>